<commit_message>
defense slides jan 7
</commit_message>
<xml_diff>
--- a/ru_defense_slides.pptx
+++ b/ru_defense_slides.pptx
@@ -264,7 +264,7 @@
           <a:p>
             <a:fld id="{B4ACAF68-BA44-A64D-98FC-2994B8AF7CCA}" type="datetimeFigureOut">
               <a:rPr lang="en-US" smtClean="0"/>
-              <a:t>1/5/22</a:t>
+              <a:t>1/7/22</a:t>
             </a:fld>
             <a:endParaRPr lang="en-US"/>
           </a:p>
@@ -441,7 +441,7 @@
           <a:p>
             <a:fld id="{21E02A63-8238-CF49-95F6-4E73F04318D6}" type="datetimeFigureOut">
               <a:rPr lang="en-US" smtClean="0"/>
-              <a:t>1/5/22</a:t>
+              <a:t>1/7/22</a:t>
             </a:fld>
             <a:endParaRPr lang="en-US"/>
           </a:p>
@@ -1102,13 +1102,16 @@
           <a:p>
             <a:r>
               <a:rPr lang="en-US" dirty="0"/>
-              <a:t>Now, a lot of prediction research in language has examined prediction in language, however, recent neurocognitive research, for instance, indicates that predictive mechanisms may be shared across cognition. I therefore wanted to explore how language prediction relates to prediction in other non-language skills.</a:t>
-            </a:r>
+              <a:t>With the third study we switch gears a little.</a:t>
+            </a:r>
+          </a:p>
+          <a:p>
+            <a:endParaRPr lang="en-US" dirty="0"/>
           </a:p>
           <a:p>
             <a:r>
               <a:rPr lang="en-US" dirty="0"/>
-              <a:t>Other skills in which predictions are generated are…</a:t>
+              <a:t>A lot of prediction research in language has examined prediction in language, however, recent neurocognitive research, for instance, indicates that predictive mechanisms may be shared across cognition. I therefore wanted to explore how language prediction relates to prediction in other non-language skills.</a:t>
             </a:r>
           </a:p>
           <a:p>
@@ -1136,6 +1139,55 @@
                 <a:cs typeface="+mn-cs"/>
               </a:rPr>
               <a:t>across domains is possible if the domains share common features (Thorndike &amp; Woodworth, 1901) and cognitive elements (Anderson, 1990).</a:t>
+            </a:r>
+          </a:p>
+          <a:p>
+            <a:endParaRPr lang="en-US" sz="1200" kern="1200" dirty="0">
+              <a:solidFill>
+                <a:schemeClr val="tx1"/>
+              </a:solidFill>
+              <a:effectLst/>
+              <a:latin typeface="+mn-lt"/>
+              <a:ea typeface="+mn-ea"/>
+              <a:cs typeface="+mn-cs"/>
+            </a:endParaRPr>
+          </a:p>
+          <a:p>
+            <a:r>
+              <a:rPr lang="en-US" sz="1200" kern="1200" dirty="0">
+                <a:solidFill>
+                  <a:schemeClr val="tx1"/>
+                </a:solidFill>
+                <a:effectLst/>
+                <a:latin typeface="+mn-lt"/>
+                <a:ea typeface="+mn-ea"/>
+                <a:cs typeface="+mn-cs"/>
+              </a:rPr>
+              <a:t>Most previous research on e.g., chess or playing videogames suggest no transfer </a:t>
+            </a:r>
+            <a:r>
+              <a:rPr lang="en-US" sz="1200" kern="1200" dirty="0" err="1">
+                <a:solidFill>
+                  <a:schemeClr val="tx1"/>
+                </a:solidFill>
+                <a:effectLst/>
+                <a:latin typeface="+mn-lt"/>
+                <a:ea typeface="+mn-ea"/>
+                <a:cs typeface="+mn-cs"/>
+              </a:rPr>
+              <a:t>bc</a:t>
+            </a:r>
+            <a:r>
+              <a:rPr lang="en-US" sz="1200" kern="1200" dirty="0">
+                <a:solidFill>
+                  <a:schemeClr val="tx1"/>
+                </a:solidFill>
+                <a:effectLst/>
+                <a:latin typeface="+mn-lt"/>
+                <a:ea typeface="+mn-ea"/>
+                <a:cs typeface="+mn-cs"/>
+              </a:rPr>
+              <a:t> skills too specific. However, prediction is a more general mechanism that is used in more than one cognitive domain/skill. </a:t>
             </a:r>
             <a:endParaRPr lang="en-US" dirty="0"/>
           </a:p>
@@ -1231,6 +1283,140 @@
               <a:rPr lang="en-US" dirty="0"/>
               <a:t>Previous research between these two fields has revealed that language and visuospatial processing may be associated in several ways…</a:t>
             </a:r>
+          </a:p>
+          <a:p>
+            <a:endParaRPr lang="en-US" dirty="0"/>
+          </a:p>
+          <a:p>
+            <a:endParaRPr lang="en-US" dirty="0"/>
+          </a:p>
+          <a:p>
+            <a:endParaRPr lang="en-US" dirty="0"/>
+          </a:p>
+          <a:p>
+            <a:r>
+              <a:rPr lang="en-US" dirty="0"/>
+              <a:t>______</a:t>
+            </a:r>
+          </a:p>
+          <a:p>
+            <a:pPr lvl="1"/>
+            <a:r>
+              <a:rPr lang="en-US" dirty="0">
+                <a:solidFill>
+                  <a:schemeClr val="bg1">
+                    <a:lumMod val="75000"/>
+                  </a:schemeClr>
+                </a:solidFill>
+                <a:latin typeface="Seravek" panose="020B0503040000020004" pitchFamily="34" charset="0"/>
+              </a:rPr>
+              <a:t>Reading abilities </a:t>
+            </a:r>
+            <a:r>
+              <a:rPr lang="en-US" sz="1000" dirty="0">
+                <a:solidFill>
+                  <a:schemeClr val="bg1">
+                    <a:lumMod val="75000"/>
+                  </a:schemeClr>
+                </a:solidFill>
+                <a:latin typeface="Seravek" panose="020B0503040000020004" pitchFamily="34" charset="0"/>
+              </a:rPr>
+              <a:t>(</a:t>
+            </a:r>
+            <a:r>
+              <a:rPr lang="en-US" sz="1000" dirty="0" err="1">
+                <a:solidFill>
+                  <a:schemeClr val="bg1">
+                    <a:lumMod val="75000"/>
+                  </a:schemeClr>
+                </a:solidFill>
+                <a:latin typeface="Seravek" panose="020B0503040000020004" pitchFamily="34" charset="0"/>
+              </a:rPr>
+              <a:t>Helland</a:t>
+            </a:r>
+            <a:r>
+              <a:rPr lang="en-US" sz="1000" dirty="0">
+                <a:solidFill>
+                  <a:schemeClr val="bg1">
+                    <a:lumMod val="75000"/>
+                  </a:schemeClr>
+                </a:solidFill>
+                <a:latin typeface="Seravek" panose="020B0503040000020004" pitchFamily="34" charset="0"/>
+              </a:rPr>
+              <a:t> &amp; </a:t>
+            </a:r>
+            <a:r>
+              <a:rPr lang="en-US" sz="1000" dirty="0" err="1">
+                <a:solidFill>
+                  <a:schemeClr val="bg1">
+                    <a:lumMod val="75000"/>
+                  </a:schemeClr>
+                </a:solidFill>
+                <a:latin typeface="Seravek" panose="020B0503040000020004" pitchFamily="34" charset="0"/>
+              </a:rPr>
+              <a:t>Morken</a:t>
+            </a:r>
+            <a:r>
+              <a:rPr lang="en-US" sz="1000" dirty="0">
+                <a:solidFill>
+                  <a:schemeClr val="bg1">
+                    <a:lumMod val="75000"/>
+                  </a:schemeClr>
+                </a:solidFill>
+                <a:latin typeface="Seravek" panose="020B0503040000020004" pitchFamily="34" charset="0"/>
+              </a:rPr>
+              <a:t>, 2016; Estes &amp; </a:t>
+            </a:r>
+            <a:r>
+              <a:rPr lang="en-US" sz="1000" dirty="0" err="1">
+                <a:solidFill>
+                  <a:schemeClr val="bg1">
+                    <a:lumMod val="75000"/>
+                  </a:schemeClr>
+                </a:solidFill>
+                <a:latin typeface="Seravek" panose="020B0503040000020004" pitchFamily="34" charset="0"/>
+              </a:rPr>
+              <a:t>Barsalou</a:t>
+            </a:r>
+            <a:r>
+              <a:rPr lang="en-US" sz="1000" dirty="0">
+                <a:solidFill>
+                  <a:schemeClr val="bg1">
+                    <a:lumMod val="75000"/>
+                  </a:schemeClr>
+                </a:solidFill>
+                <a:latin typeface="Seravek" panose="020B0503040000020004" pitchFamily="34" charset="0"/>
+              </a:rPr>
+              <a:t>, 2018)</a:t>
+            </a:r>
+          </a:p>
+          <a:p>
+            <a:pPr lvl="1"/>
+            <a:r>
+              <a:rPr lang="en-US" dirty="0">
+                <a:solidFill>
+                  <a:schemeClr val="bg1">
+                    <a:lumMod val="75000"/>
+                  </a:schemeClr>
+                </a:solidFill>
+                <a:latin typeface="Seravek" panose="020B0503040000020004" pitchFamily="34" charset="0"/>
+              </a:rPr>
+              <a:t>Space organization and expressions to talk about it </a:t>
+            </a:r>
+            <a:r>
+              <a:rPr lang="en-US" sz="1000" dirty="0">
+                <a:solidFill>
+                  <a:schemeClr val="bg1">
+                    <a:lumMod val="75000"/>
+                  </a:schemeClr>
+                </a:solidFill>
+                <a:latin typeface="Seravek" panose="020B0503040000020004" pitchFamily="34" charset="0"/>
+              </a:rPr>
+              <a:t>(Crawford et al., 2000)</a:t>
+            </a:r>
+          </a:p>
+          <a:p>
+            <a:endParaRPr lang="en-US" dirty="0"/>
           </a:p>
         </p:txBody>
       </p:sp>
@@ -4804,14 +4990,14 @@
           </a:ln>
           <a:extLst>
             <a:ext uri="{909E8E84-426E-40dd-AFC4-6F175D3DCCD1}">
-              <a14:hiddenFill xmlns="" xmlns:a14="http://schemas.microsoft.com/office/drawing/2010/main">
+              <a14:hiddenFill xmlns:a14="http://schemas.microsoft.com/office/drawing/2010/main" xmlns="">
                 <a:solidFill>
                   <a:srgbClr val="FFFFFF"/>
                 </a:solidFill>
               </a14:hiddenFill>
             </a:ext>
             <a:ext uri="{91240B29-F687-4f45-9708-019B960494DF}">
-              <a14:hiddenLine xmlns="" xmlns:a14="http://schemas.microsoft.com/office/drawing/2010/main" w="9525">
+              <a14:hiddenLine xmlns:a14="http://schemas.microsoft.com/office/drawing/2010/main" xmlns="" w="9525">
                 <a:solidFill>
                   <a:srgbClr val="000000"/>
                 </a:solidFill>
@@ -4821,7 +5007,7 @@
               </a14:hiddenLine>
             </a:ext>
             <a:ext uri="{FAA26D3D-D897-4be2-8F04-BA451C77F1D7}">
-              <ma14:placeholderFlag xmlns="" xmlns:ma14="http://schemas.microsoft.com/office/mac/drawingml/2011/main" val="1"/>
+              <ma14:placeholderFlag xmlns:ma14="http://schemas.microsoft.com/office/mac/drawingml/2011/main" xmlns="" val="1"/>
             </a:ext>
           </a:extLst>
         </p:spPr>
@@ -4866,14 +5052,14 @@
           </a:ln>
           <a:extLst>
             <a:ext uri="{909E8E84-426E-40dd-AFC4-6F175D3DCCD1}">
-              <a14:hiddenFill xmlns="" xmlns:a14="http://schemas.microsoft.com/office/drawing/2010/main">
+              <a14:hiddenFill xmlns:a14="http://schemas.microsoft.com/office/drawing/2010/main" xmlns="">
                 <a:solidFill>
                   <a:srgbClr val="FFFFFF"/>
                 </a:solidFill>
               </a14:hiddenFill>
             </a:ext>
             <a:ext uri="{91240B29-F687-4f45-9708-019B960494DF}">
-              <a14:hiddenLine xmlns="" xmlns:a14="http://schemas.microsoft.com/office/drawing/2010/main" w="9525">
+              <a14:hiddenLine xmlns:a14="http://schemas.microsoft.com/office/drawing/2010/main" xmlns="" w="9525">
                 <a:solidFill>
                   <a:srgbClr val="000000"/>
                 </a:solidFill>
@@ -4883,7 +5069,7 @@
               </a14:hiddenLine>
             </a:ext>
             <a:ext uri="{FAA26D3D-D897-4be2-8F04-BA451C77F1D7}">
-              <ma14:placeholderFlag xmlns="" xmlns:ma14="http://schemas.microsoft.com/office/mac/drawingml/2011/main" val="1"/>
+              <ma14:placeholderFlag xmlns:ma14="http://schemas.microsoft.com/office/mac/drawingml/2011/main" xmlns="" val="1"/>
             </a:ext>
           </a:extLst>
         </p:spPr>
@@ -5919,14 +6105,14 @@
           </a:ln>
           <a:extLst>
             <a:ext uri="{909E8E84-426E-40dd-AFC4-6F175D3DCCD1}">
-              <a14:hiddenFill xmlns="" xmlns:a14="http://schemas.microsoft.com/office/drawing/2010/main">
+              <a14:hiddenFill xmlns:a14="http://schemas.microsoft.com/office/drawing/2010/main" xmlns="">
                 <a:solidFill>
                   <a:srgbClr val="FFFFFF"/>
                 </a:solidFill>
               </a14:hiddenFill>
             </a:ext>
             <a:ext uri="{91240B29-F687-4f45-9708-019B960494DF}">
-              <a14:hiddenLine xmlns="" xmlns:a14="http://schemas.microsoft.com/office/drawing/2010/main" w="9525">
+              <a14:hiddenLine xmlns:a14="http://schemas.microsoft.com/office/drawing/2010/main" xmlns="" w="9525">
                 <a:solidFill>
                   <a:srgbClr val="000000"/>
                 </a:solidFill>
@@ -5936,7 +6122,7 @@
               </a14:hiddenLine>
             </a:ext>
             <a:ext uri="{FAA26D3D-D897-4be2-8F04-BA451C77F1D7}">
-              <ma14:placeholderFlag xmlns="" xmlns:ma14="http://schemas.microsoft.com/office/mac/drawingml/2011/main" val="1"/>
+              <ma14:placeholderFlag xmlns:ma14="http://schemas.microsoft.com/office/mac/drawingml/2011/main" xmlns="" val="1"/>
             </a:ext>
           </a:extLst>
         </p:spPr>
@@ -6725,81 +6911,6 @@
               <a:rPr lang="en-US" dirty="0">
                 <a:latin typeface="Seravek" panose="020B0503040000020004" pitchFamily="34" charset="0"/>
               </a:rPr>
-              <a:t>Predictions generated in other domains too:</a:t>
-            </a:r>
-          </a:p>
-          <a:p>
-            <a:pPr lvl="1"/>
-            <a:r>
-              <a:rPr lang="en-US" dirty="0">
-                <a:latin typeface="Seravek" panose="020B0503040000020004" pitchFamily="34" charset="0"/>
-              </a:rPr>
-              <a:t>Sports </a:t>
-            </a:r>
-            <a:r>
-              <a:rPr lang="en-US" sz="1000" dirty="0">
-                <a:latin typeface="Seravek" panose="020B0503040000020004" pitchFamily="34" charset="0"/>
-              </a:rPr>
-              <a:t>(e.g., Bishop et al., 2013; </a:t>
-            </a:r>
-            <a:r>
-              <a:rPr lang="en-US" sz="1000" dirty="0" err="1"/>
-              <a:t>Wimshurst</a:t>
-            </a:r>
-            <a:r>
-              <a:rPr lang="en-US" sz="1000" dirty="0"/>
-              <a:t> et al., 2016</a:t>
-            </a:r>
-            <a:r>
-              <a:rPr lang="en-US" sz="1000" dirty="0">
-                <a:latin typeface="Seravek" panose="020B0503040000020004" pitchFamily="34" charset="0"/>
-              </a:rPr>
-              <a:t>)</a:t>
-            </a:r>
-          </a:p>
-          <a:p>
-            <a:pPr lvl="1"/>
-            <a:r>
-              <a:rPr lang="en-US" dirty="0">
-                <a:latin typeface="Seravek" panose="020B0503040000020004" pitchFamily="34" charset="0"/>
-              </a:rPr>
-              <a:t>Driving </a:t>
-            </a:r>
-            <a:r>
-              <a:rPr lang="en-US" sz="1000" dirty="0">
-                <a:latin typeface="Seravek" panose="020B0503040000020004" pitchFamily="34" charset="0"/>
-              </a:rPr>
-              <a:t>(e.g., Morando et al., 2016; Yamani et al., 2018)</a:t>
-            </a:r>
-          </a:p>
-          <a:p>
-            <a:pPr lvl="1"/>
-            <a:r>
-              <a:rPr lang="en-US" dirty="0">
-                <a:latin typeface="Seravek" panose="020B0503040000020004" pitchFamily="34" charset="0"/>
-              </a:rPr>
-              <a:t>Music </a:t>
-            </a:r>
-            <a:r>
-              <a:rPr lang="en-US" sz="1000" dirty="0">
-                <a:latin typeface="Seravek" panose="020B0503040000020004" pitchFamily="34" charset="0"/>
-              </a:rPr>
-              <a:t>(e.g., Huron, 2016)</a:t>
-            </a:r>
-            <a:endParaRPr lang="en-US" dirty="0">
-              <a:latin typeface="Seravek" panose="020B0503040000020004" pitchFamily="34" charset="0"/>
-            </a:endParaRPr>
-          </a:p>
-          <a:p>
-            <a:endParaRPr lang="en-US" dirty="0">
-              <a:latin typeface="Seravek" panose="020B0503040000020004" pitchFamily="34" charset="0"/>
-            </a:endParaRPr>
-          </a:p>
-          <a:p>
-            <a:r>
-              <a:rPr lang="en-US" dirty="0">
-                <a:latin typeface="Seravek" panose="020B0503040000020004" pitchFamily="34" charset="0"/>
-              </a:rPr>
               <a:t>Domain-specific models of learning </a:t>
             </a:r>
             <a:r>
@@ -6843,6 +6954,83 @@
               <a:rPr lang="en-US" sz="1000" dirty="0"/>
               <a:t>(Anderson, 1990; Thorndike &amp; Woodworth, 1901)</a:t>
             </a:r>
+          </a:p>
+          <a:p>
+            <a:endParaRPr lang="en-US" sz="1000" dirty="0"/>
+          </a:p>
+          <a:p>
+            <a:endParaRPr lang="en-US" sz="1000" dirty="0"/>
+          </a:p>
+          <a:p>
+            <a:endParaRPr lang="en-US" sz="1000" dirty="0"/>
+          </a:p>
+          <a:p>
+            <a:r>
+              <a:rPr lang="en-US" dirty="0">
+                <a:latin typeface="Seravek" panose="020B0503040000020004" pitchFamily="34" charset="0"/>
+              </a:rPr>
+              <a:t>Predictions generated in other domains too:</a:t>
+            </a:r>
+          </a:p>
+          <a:p>
+            <a:pPr lvl="1"/>
+            <a:r>
+              <a:rPr lang="en-US" dirty="0">
+                <a:latin typeface="Seravek" panose="020B0503040000020004" pitchFamily="34" charset="0"/>
+              </a:rPr>
+              <a:t>Sports </a:t>
+            </a:r>
+            <a:r>
+              <a:rPr lang="en-US" sz="1000" dirty="0">
+                <a:latin typeface="Seravek" panose="020B0503040000020004" pitchFamily="34" charset="0"/>
+              </a:rPr>
+              <a:t>(e.g., Bishop et al., 2013; </a:t>
+            </a:r>
+            <a:r>
+              <a:rPr lang="en-US" sz="1000" dirty="0" err="1"/>
+              <a:t>Wimshurst</a:t>
+            </a:r>
+            <a:r>
+              <a:rPr lang="en-US" sz="1000" dirty="0"/>
+              <a:t> et al., 2016</a:t>
+            </a:r>
+            <a:r>
+              <a:rPr lang="en-US" sz="1000" dirty="0">
+                <a:latin typeface="Seravek" panose="020B0503040000020004" pitchFamily="34" charset="0"/>
+              </a:rPr>
+              <a:t>)</a:t>
+            </a:r>
+          </a:p>
+          <a:p>
+            <a:pPr lvl="1"/>
+            <a:r>
+              <a:rPr lang="en-US" dirty="0">
+                <a:latin typeface="Seravek" panose="020B0503040000020004" pitchFamily="34" charset="0"/>
+              </a:rPr>
+              <a:t>Driving </a:t>
+            </a:r>
+            <a:r>
+              <a:rPr lang="en-US" sz="1000" dirty="0">
+                <a:latin typeface="Seravek" panose="020B0503040000020004" pitchFamily="34" charset="0"/>
+              </a:rPr>
+              <a:t>(e.g., Morando et al., 2016; Yamani et al., 2018)</a:t>
+            </a:r>
+          </a:p>
+          <a:p>
+            <a:pPr lvl="1"/>
+            <a:r>
+              <a:rPr lang="en-US" dirty="0">
+                <a:latin typeface="Seravek" panose="020B0503040000020004" pitchFamily="34" charset="0"/>
+              </a:rPr>
+              <a:t>Music </a:t>
+            </a:r>
+            <a:r>
+              <a:rPr lang="en-US" sz="1000" dirty="0">
+                <a:latin typeface="Seravek" panose="020B0503040000020004" pitchFamily="34" charset="0"/>
+              </a:rPr>
+              <a:t>(e.g., Huron, 2016)</a:t>
+            </a:r>
+            <a:endParaRPr lang="en-US" sz="1000" dirty="0"/>
           </a:p>
           <a:p>
             <a:endParaRPr lang="en-US" dirty="0"/>
@@ -7038,6 +7226,178 @@
   <p:clrMapOvr>
     <a:masterClrMapping/>
   </p:clrMapOvr>
+  <p:timing>
+    <p:tnLst>
+      <p:par>
+        <p:cTn id="1" dur="indefinite" restart="never" nodeType="tmRoot">
+          <p:childTnLst>
+            <p:seq concurrent="1" nextAc="seek">
+              <p:cTn id="2" dur="indefinite" nodeType="mainSeq">
+                <p:childTnLst>
+                  <p:par>
+                    <p:cTn id="3" fill="hold">
+                      <p:stCondLst>
+                        <p:cond delay="indefinite"/>
+                      </p:stCondLst>
+                      <p:childTnLst>
+                        <p:par>
+                          <p:cTn id="4" fill="hold">
+                            <p:stCondLst>
+                              <p:cond delay="0"/>
+                            </p:stCondLst>
+                            <p:childTnLst>
+                              <p:par>
+                                <p:cTn id="5" presetID="1" presetClass="entr" presetSubtype="0" fill="hold" nodeType="clickEffect">
+                                  <p:stCondLst>
+                                    <p:cond delay="0"/>
+                                  </p:stCondLst>
+                                  <p:childTnLst>
+                                    <p:set>
+                                      <p:cBhvr>
+                                        <p:cTn id="6" dur="1" fill="hold">
+                                          <p:stCondLst>
+                                            <p:cond delay="0"/>
+                                          </p:stCondLst>
+                                        </p:cTn>
+                                        <p:tgtEl>
+                                          <p:spTgt spid="3">
+                                            <p:txEl>
+                                              <p:pRg st="5" end="5"/>
+                                            </p:txEl>
+                                          </p:spTgt>
+                                        </p:tgtEl>
+                                        <p:attrNameLst>
+                                          <p:attrName>style.visibility</p:attrName>
+                                        </p:attrNameLst>
+                                      </p:cBhvr>
+                                      <p:to>
+                                        <p:strVal val="visible"/>
+                                      </p:to>
+                                    </p:set>
+                                  </p:childTnLst>
+                                </p:cTn>
+                              </p:par>
+                              <p:par>
+                                <p:cTn id="7" presetID="1" presetClass="entr" presetSubtype="0" fill="hold" nodeType="withEffect">
+                                  <p:stCondLst>
+                                    <p:cond delay="0"/>
+                                  </p:stCondLst>
+                                  <p:childTnLst>
+                                    <p:set>
+                                      <p:cBhvr>
+                                        <p:cTn id="8" dur="1" fill="hold">
+                                          <p:stCondLst>
+                                            <p:cond delay="0"/>
+                                          </p:stCondLst>
+                                        </p:cTn>
+                                        <p:tgtEl>
+                                          <p:spTgt spid="3">
+                                            <p:txEl>
+                                              <p:pRg st="6" end="6"/>
+                                            </p:txEl>
+                                          </p:spTgt>
+                                        </p:tgtEl>
+                                        <p:attrNameLst>
+                                          <p:attrName>style.visibility</p:attrName>
+                                        </p:attrNameLst>
+                                      </p:cBhvr>
+                                      <p:to>
+                                        <p:strVal val="visible"/>
+                                      </p:to>
+                                    </p:set>
+                                  </p:childTnLst>
+                                </p:cTn>
+                              </p:par>
+                              <p:par>
+                                <p:cTn id="9" presetID="1" presetClass="entr" presetSubtype="0" fill="hold" nodeType="withEffect">
+                                  <p:stCondLst>
+                                    <p:cond delay="0"/>
+                                  </p:stCondLst>
+                                  <p:childTnLst>
+                                    <p:set>
+                                      <p:cBhvr>
+                                        <p:cTn id="10" dur="1" fill="hold">
+                                          <p:stCondLst>
+                                            <p:cond delay="0"/>
+                                          </p:stCondLst>
+                                        </p:cTn>
+                                        <p:tgtEl>
+                                          <p:spTgt spid="3">
+                                            <p:txEl>
+                                              <p:pRg st="7" end="7"/>
+                                            </p:txEl>
+                                          </p:spTgt>
+                                        </p:tgtEl>
+                                        <p:attrNameLst>
+                                          <p:attrName>style.visibility</p:attrName>
+                                        </p:attrNameLst>
+                                      </p:cBhvr>
+                                      <p:to>
+                                        <p:strVal val="visible"/>
+                                      </p:to>
+                                    </p:set>
+                                  </p:childTnLst>
+                                </p:cTn>
+                              </p:par>
+                              <p:par>
+                                <p:cTn id="11" presetID="1" presetClass="entr" presetSubtype="0" fill="hold" nodeType="withEffect">
+                                  <p:stCondLst>
+                                    <p:cond delay="0"/>
+                                  </p:stCondLst>
+                                  <p:childTnLst>
+                                    <p:set>
+                                      <p:cBhvr>
+                                        <p:cTn id="12" dur="1" fill="hold">
+                                          <p:stCondLst>
+                                            <p:cond delay="0"/>
+                                          </p:stCondLst>
+                                        </p:cTn>
+                                        <p:tgtEl>
+                                          <p:spTgt spid="3">
+                                            <p:txEl>
+                                              <p:pRg st="8" end="8"/>
+                                            </p:txEl>
+                                          </p:spTgt>
+                                        </p:tgtEl>
+                                        <p:attrNameLst>
+                                          <p:attrName>style.visibility</p:attrName>
+                                        </p:attrNameLst>
+                                      </p:cBhvr>
+                                      <p:to>
+                                        <p:strVal val="visible"/>
+                                      </p:to>
+                                    </p:set>
+                                  </p:childTnLst>
+                                </p:cTn>
+                              </p:par>
+                            </p:childTnLst>
+                          </p:cTn>
+                        </p:par>
+                      </p:childTnLst>
+                    </p:cTn>
+                  </p:par>
+                </p:childTnLst>
+              </p:cTn>
+              <p:prevCondLst>
+                <p:cond evt="onPrev" delay="0">
+                  <p:tgtEl>
+                    <p:sldTgt/>
+                  </p:tgtEl>
+                </p:cond>
+              </p:prevCondLst>
+              <p:nextCondLst>
+                <p:cond evt="onNext" delay="0">
+                  <p:tgtEl>
+                    <p:sldTgt/>
+                  </p:tgtEl>
+                </p:cond>
+              </p:nextCondLst>
+            </p:seq>
+          </p:childTnLst>
+        </p:cTn>
+      </p:par>
+    </p:tnLst>
+  </p:timing>
 </p:sld>
 </file>
 
@@ -7124,122 +7484,6 @@
                 <a:latin typeface="Seravek" panose="020B0503040000020004" pitchFamily="34" charset="0"/>
               </a:rPr>
               <a:t>Vision/space ~ Language:</a:t>
-            </a:r>
-          </a:p>
-          <a:p>
-            <a:pPr lvl="1"/>
-            <a:r>
-              <a:rPr lang="en-US" dirty="0">
-                <a:solidFill>
-                  <a:schemeClr val="bg1">
-                    <a:lumMod val="75000"/>
-                  </a:schemeClr>
-                </a:solidFill>
-                <a:latin typeface="Seravek" panose="020B0503040000020004" pitchFamily="34" charset="0"/>
-              </a:rPr>
-              <a:t>Reading abilities </a:t>
-            </a:r>
-            <a:r>
-              <a:rPr lang="en-US" sz="1000" dirty="0">
-                <a:solidFill>
-                  <a:schemeClr val="bg1">
-                    <a:lumMod val="75000"/>
-                  </a:schemeClr>
-                </a:solidFill>
-                <a:latin typeface="Seravek" panose="020B0503040000020004" pitchFamily="34" charset="0"/>
-              </a:rPr>
-              <a:t>(</a:t>
-            </a:r>
-            <a:r>
-              <a:rPr lang="en-US" sz="1000" dirty="0" err="1">
-                <a:solidFill>
-                  <a:schemeClr val="bg1">
-                    <a:lumMod val="75000"/>
-                  </a:schemeClr>
-                </a:solidFill>
-                <a:latin typeface="Seravek" panose="020B0503040000020004" pitchFamily="34" charset="0"/>
-              </a:rPr>
-              <a:t>Helland</a:t>
-            </a:r>
-            <a:r>
-              <a:rPr lang="en-US" sz="1000" dirty="0">
-                <a:solidFill>
-                  <a:schemeClr val="bg1">
-                    <a:lumMod val="75000"/>
-                  </a:schemeClr>
-                </a:solidFill>
-                <a:latin typeface="Seravek" panose="020B0503040000020004" pitchFamily="34" charset="0"/>
-              </a:rPr>
-              <a:t> &amp; </a:t>
-            </a:r>
-            <a:r>
-              <a:rPr lang="en-US" sz="1000" dirty="0" err="1">
-                <a:solidFill>
-                  <a:schemeClr val="bg1">
-                    <a:lumMod val="75000"/>
-                  </a:schemeClr>
-                </a:solidFill>
-                <a:latin typeface="Seravek" panose="020B0503040000020004" pitchFamily="34" charset="0"/>
-              </a:rPr>
-              <a:t>Morken</a:t>
-            </a:r>
-            <a:r>
-              <a:rPr lang="en-US" sz="1000" dirty="0">
-                <a:solidFill>
-                  <a:schemeClr val="bg1">
-                    <a:lumMod val="75000"/>
-                  </a:schemeClr>
-                </a:solidFill>
-                <a:latin typeface="Seravek" panose="020B0503040000020004" pitchFamily="34" charset="0"/>
-              </a:rPr>
-              <a:t>, 2016; Estes &amp; </a:t>
-            </a:r>
-            <a:r>
-              <a:rPr lang="en-US" sz="1000" dirty="0" err="1">
-                <a:solidFill>
-                  <a:schemeClr val="bg1">
-                    <a:lumMod val="75000"/>
-                  </a:schemeClr>
-                </a:solidFill>
-                <a:latin typeface="Seravek" panose="020B0503040000020004" pitchFamily="34" charset="0"/>
-              </a:rPr>
-              <a:t>Barsalou</a:t>
-            </a:r>
-            <a:r>
-              <a:rPr lang="en-US" sz="1000" dirty="0">
-                <a:solidFill>
-                  <a:schemeClr val="bg1">
-                    <a:lumMod val="75000"/>
-                  </a:schemeClr>
-                </a:solidFill>
-                <a:latin typeface="Seravek" panose="020B0503040000020004" pitchFamily="34" charset="0"/>
-              </a:rPr>
-              <a:t>, 2018)</a:t>
-            </a:r>
-          </a:p>
-          <a:p>
-            <a:pPr lvl="1"/>
-            <a:r>
-              <a:rPr lang="en-US" dirty="0">
-                <a:solidFill>
-                  <a:schemeClr val="bg1">
-                    <a:lumMod val="75000"/>
-                  </a:schemeClr>
-                </a:solidFill>
-                <a:latin typeface="Seravek" panose="020B0503040000020004" pitchFamily="34" charset="0"/>
-              </a:rPr>
-              <a:t>Space organization and expressions to talk about it </a:t>
-            </a:r>
-            <a:r>
-              <a:rPr lang="en-US" sz="1000" dirty="0">
-                <a:solidFill>
-                  <a:schemeClr val="bg1">
-                    <a:lumMod val="75000"/>
-                  </a:schemeClr>
-                </a:solidFill>
-                <a:latin typeface="Seravek" panose="020B0503040000020004" pitchFamily="34" charset="0"/>
-              </a:rPr>
-              <a:t>(Crawford et al., 2000)</a:t>
             </a:r>
           </a:p>
           <a:p>
@@ -7516,7 +7760,7 @@
                                         <p:tgtEl>
                                           <p:spTgt spid="3">
                                             <p:txEl>
-                                              <p:pRg st="2" end="2"/>
+                                              <p:pRg st="4" end="4"/>
                                             </p:txEl>
                                           </p:spTgt>
                                         </p:tgtEl>
@@ -7534,178 +7778,7 @@
                                         <p:tgtEl>
                                           <p:spTgt spid="3">
                                             <p:txEl>
-                                              <p:pRg st="2" end="2"/>
-                                            </p:txEl>
-                                          </p:spTgt>
-                                        </p:tgtEl>
-                                      </p:cBhvr>
-                                    </p:animEffect>
-                                  </p:childTnLst>
-                                </p:cTn>
-                              </p:par>
-                            </p:childTnLst>
-                          </p:cTn>
-                        </p:par>
-                      </p:childTnLst>
-                    </p:cTn>
-                  </p:par>
-                  <p:par>
-                    <p:cTn id="8" fill="hold">
-                      <p:stCondLst>
-                        <p:cond delay="indefinite"/>
-                      </p:stCondLst>
-                      <p:childTnLst>
-                        <p:par>
-                          <p:cTn id="9" fill="hold">
-                            <p:stCondLst>
-                              <p:cond delay="0"/>
-                            </p:stCondLst>
-                            <p:childTnLst>
-                              <p:par>
-                                <p:cTn id="10" presetID="9" presetClass="emph" presetSubtype="0" nodeType="clickEffect">
-                                  <p:stCondLst>
-                                    <p:cond delay="0"/>
-                                  </p:stCondLst>
-                                  <p:childTnLst>
-                                    <p:set>
-                                      <p:cBhvr>
-                                        <p:cTn id="11" dur="indefinite"/>
-                                        <p:tgtEl>
-                                          <p:spTgt spid="3">
-                                            <p:txEl>
-                                              <p:pRg st="3" end="3"/>
-                                            </p:txEl>
-                                          </p:spTgt>
-                                        </p:tgtEl>
-                                        <p:attrNameLst>
-                                          <p:attrName>style.opacity</p:attrName>
-                                        </p:attrNameLst>
-                                      </p:cBhvr>
-                                      <p:to>
-                                        <p:strVal val="0.5"/>
-                                      </p:to>
-                                    </p:set>
-                                    <p:animEffect filter="image" prLst="opacity: 0.5">
-                                      <p:cBhvr rctx="IE">
-                                        <p:cTn id="12" dur="indefinite"/>
-                                        <p:tgtEl>
-                                          <p:spTgt spid="3">
-                                            <p:txEl>
-                                              <p:pRg st="3" end="3"/>
-                                            </p:txEl>
-                                          </p:spTgt>
-                                        </p:tgtEl>
-                                      </p:cBhvr>
-                                    </p:animEffect>
-                                  </p:childTnLst>
-                                </p:cTn>
-                              </p:par>
-                            </p:childTnLst>
-                          </p:cTn>
-                        </p:par>
-                      </p:childTnLst>
-                    </p:cTn>
-                  </p:par>
-                  <p:par>
-                    <p:cTn id="13" fill="hold">
-                      <p:stCondLst>
-                        <p:cond delay="indefinite"/>
-                      </p:stCondLst>
-                      <p:childTnLst>
-                        <p:par>
-                          <p:cTn id="14" fill="hold">
-                            <p:stCondLst>
-                              <p:cond delay="0"/>
-                            </p:stCondLst>
-                            <p:childTnLst>
-                              <p:par>
-                                <p:cTn id="15" presetID="9" presetClass="emph" presetSubtype="0" nodeType="clickEffect">
-                                  <p:stCondLst>
-                                    <p:cond delay="0"/>
-                                  </p:stCondLst>
-                                  <p:childTnLst>
-                                    <p:set>
-                                      <p:cBhvr>
-                                        <p:cTn id="16" dur="indefinite"/>
-                                        <p:tgtEl>
-                                          <p:spTgt spid="3">
-                                            <p:txEl>
                                               <p:pRg st="4" end="4"/>
-                                            </p:txEl>
-                                          </p:spTgt>
-                                        </p:tgtEl>
-                                        <p:attrNameLst>
-                                          <p:attrName>style.opacity</p:attrName>
-                                        </p:attrNameLst>
-                                      </p:cBhvr>
-                                      <p:to>
-                                        <p:strVal val="0.5"/>
-                                      </p:to>
-                                    </p:set>
-                                    <p:animEffect filter="image" prLst="opacity: 0.5">
-                                      <p:cBhvr rctx="IE">
-                                        <p:cTn id="17" dur="indefinite"/>
-                                        <p:tgtEl>
-                                          <p:spTgt spid="3">
-                                            <p:txEl>
-                                              <p:pRg st="4" end="4"/>
-                                            </p:txEl>
-                                          </p:spTgt>
-                                        </p:tgtEl>
-                                      </p:cBhvr>
-                                    </p:animEffect>
-                                  </p:childTnLst>
-                                </p:cTn>
-                              </p:par>
-                            </p:childTnLst>
-                          </p:cTn>
-                        </p:par>
-                      </p:childTnLst>
-                    </p:cTn>
-                  </p:par>
-                  <p:par>
-                    <p:cTn id="18" fill="hold">
-                      <p:stCondLst>
-                        <p:cond delay="indefinite"/>
-                      </p:stCondLst>
-                      <p:childTnLst>
-                        <p:par>
-                          <p:cTn id="19" fill="hold">
-                            <p:stCondLst>
-                              <p:cond delay="0"/>
-                            </p:stCondLst>
-                            <p:childTnLst>
-                              <p:par>
-                                <p:cTn id="20" presetID="9" presetClass="emph" presetSubtype="0" nodeType="clickEffect">
-                                  <p:stCondLst>
-                                    <p:cond delay="0"/>
-                                  </p:stCondLst>
-                                  <p:childTnLst>
-                                    <p:set>
-                                      <p:cBhvr>
-                                        <p:cTn id="21" dur="indefinite"/>
-                                        <p:tgtEl>
-                                          <p:spTgt spid="3">
-                                            <p:txEl>
-                                              <p:pRg st="6" end="6"/>
-                                            </p:txEl>
-                                          </p:spTgt>
-                                        </p:tgtEl>
-                                        <p:attrNameLst>
-                                          <p:attrName>style.opacity</p:attrName>
-                                        </p:attrNameLst>
-                                      </p:cBhvr>
-                                      <p:to>
-                                        <p:strVal val="0.5"/>
-                                      </p:to>
-                                    </p:set>
-                                    <p:animEffect filter="image" prLst="opacity: 0.5">
-                                      <p:cBhvr rctx="IE">
-                                        <p:cTn id="22" dur="indefinite"/>
-                                        <p:tgtEl>
-                                          <p:spTgt spid="3">
-                                            <p:txEl>
-                                              <p:pRg st="6" end="6"/>
                                             </p:txEl>
                                           </p:spTgt>
                                         </p:tgtEl>
@@ -8006,14 +8079,14 @@
           </a:ln>
           <a:extLst>
             <a:ext uri="{909E8E84-426E-40dd-AFC4-6F175D3DCCD1}">
-              <a14:hiddenFill xmlns="" xmlns:a14="http://schemas.microsoft.com/office/drawing/2010/main">
+              <a14:hiddenFill xmlns:a14="http://schemas.microsoft.com/office/drawing/2010/main" xmlns="">
                 <a:solidFill>
                   <a:srgbClr val="FFFFFF"/>
                 </a:solidFill>
               </a14:hiddenFill>
             </a:ext>
             <a:ext uri="{91240B29-F687-4f45-9708-019B960494DF}">
-              <a14:hiddenLine xmlns="" xmlns:a14="http://schemas.microsoft.com/office/drawing/2010/main" w="9525">
+              <a14:hiddenLine xmlns:a14="http://schemas.microsoft.com/office/drawing/2010/main" xmlns="" w="9525">
                 <a:solidFill>
                   <a:srgbClr val="000000"/>
                 </a:solidFill>
@@ -8023,7 +8096,7 @@
               </a14:hiddenLine>
             </a:ext>
             <a:ext uri="{FAA26D3D-D897-4be2-8F04-BA451C77F1D7}">
-              <ma14:placeholderFlag xmlns="" xmlns:ma14="http://schemas.microsoft.com/office/mac/drawingml/2011/main" val="1"/>
+              <ma14:placeholderFlag xmlns:ma14="http://schemas.microsoft.com/office/mac/drawingml/2011/main" xmlns="" val="1"/>
             </a:ext>
           </a:extLst>
         </p:spPr>
@@ -8070,14 +8143,14 @@
           </a:ln>
           <a:extLst>
             <a:ext uri="{909E8E84-426E-40dd-AFC4-6F175D3DCCD1}">
-              <a14:hiddenFill xmlns="" xmlns:a14="http://schemas.microsoft.com/office/drawing/2010/main">
+              <a14:hiddenFill xmlns:a14="http://schemas.microsoft.com/office/drawing/2010/main" xmlns="">
                 <a:solidFill>
                   <a:srgbClr val="FFFFFF"/>
                 </a:solidFill>
               </a14:hiddenFill>
             </a:ext>
             <a:ext uri="{91240B29-F687-4f45-9708-019B960494DF}">
-              <a14:hiddenLine xmlns="" xmlns:a14="http://schemas.microsoft.com/office/drawing/2010/main" w="9525">
+              <a14:hiddenLine xmlns:a14="http://schemas.microsoft.com/office/drawing/2010/main" xmlns="" w="9525">
                 <a:solidFill>
                   <a:srgbClr val="000000"/>
                 </a:solidFill>
@@ -8087,7 +8160,7 @@
               </a14:hiddenLine>
             </a:ext>
             <a:ext uri="{FAA26D3D-D897-4be2-8F04-BA451C77F1D7}">
-              <ma14:placeholderFlag xmlns="" xmlns:ma14="http://schemas.microsoft.com/office/mac/drawingml/2011/main" val="1"/>
+              <ma14:placeholderFlag xmlns:ma14="http://schemas.microsoft.com/office/mac/drawingml/2011/main" xmlns="" val="1"/>
             </a:ext>
           </a:extLst>
         </p:spPr>
@@ -8134,14 +8207,14 @@
           </a:ln>
           <a:extLst>
             <a:ext uri="{909E8E84-426E-40dd-AFC4-6F175D3DCCD1}">
-              <a14:hiddenFill xmlns="" xmlns:a14="http://schemas.microsoft.com/office/drawing/2010/main">
+              <a14:hiddenFill xmlns:a14="http://schemas.microsoft.com/office/drawing/2010/main" xmlns="">
                 <a:solidFill>
                   <a:srgbClr val="FFFFFF"/>
                 </a:solidFill>
               </a14:hiddenFill>
             </a:ext>
             <a:ext uri="{91240B29-F687-4f45-9708-019B960494DF}">
-              <a14:hiddenLine xmlns="" xmlns:a14="http://schemas.microsoft.com/office/drawing/2010/main" w="9525">
+              <a14:hiddenLine xmlns:a14="http://schemas.microsoft.com/office/drawing/2010/main" xmlns="" w="9525">
                 <a:solidFill>
                   <a:srgbClr val="000000"/>
                 </a:solidFill>
@@ -8151,7 +8224,7 @@
               </a14:hiddenLine>
             </a:ext>
             <a:ext uri="{FAA26D3D-D897-4be2-8F04-BA451C77F1D7}">
-              <ma14:placeholderFlag xmlns="" xmlns:ma14="http://schemas.microsoft.com/office/mac/drawingml/2011/main" val="1"/>
+              <ma14:placeholderFlag xmlns:ma14="http://schemas.microsoft.com/office/mac/drawingml/2011/main" xmlns="" val="1"/>
             </a:ext>
           </a:extLst>
         </p:spPr>
@@ -13084,14 +13157,14 @@
           </a:ln>
           <a:extLst>
             <a:ext uri="{909E8E84-426E-40dd-AFC4-6F175D3DCCD1}">
-              <a14:hiddenFill xmlns="" xmlns:a14="http://schemas.microsoft.com/office/drawing/2010/main">
+              <a14:hiddenFill xmlns:a14="http://schemas.microsoft.com/office/drawing/2010/main" xmlns="">
                 <a:solidFill>
                   <a:srgbClr val="FFFFFF"/>
                 </a:solidFill>
               </a14:hiddenFill>
             </a:ext>
             <a:ext uri="{91240B29-F687-4f45-9708-019B960494DF}">
-              <a14:hiddenLine xmlns="" xmlns:a14="http://schemas.microsoft.com/office/drawing/2010/main" w="9525">
+              <a14:hiddenLine xmlns:a14="http://schemas.microsoft.com/office/drawing/2010/main" xmlns="" w="9525">
                 <a:solidFill>
                   <a:srgbClr val="000000"/>
                 </a:solidFill>
@@ -13101,7 +13174,7 @@
               </a14:hiddenLine>
             </a:ext>
             <a:ext uri="{FAA26D3D-D897-4be2-8F04-BA451C77F1D7}">
-              <ma14:placeholderFlag xmlns="" xmlns:ma14="http://schemas.microsoft.com/office/mac/drawingml/2011/main" val="1"/>
+              <ma14:placeholderFlag xmlns:ma14="http://schemas.microsoft.com/office/mac/drawingml/2011/main" xmlns="" val="1"/>
             </a:ext>
           </a:extLst>
         </p:spPr>
@@ -13134,14 +13207,14 @@
           </a:ln>
           <a:extLst>
             <a:ext uri="{909E8E84-426E-40dd-AFC4-6F175D3DCCD1}">
-              <a14:hiddenFill xmlns="" xmlns:a14="http://schemas.microsoft.com/office/drawing/2010/main">
+              <a14:hiddenFill xmlns:a14="http://schemas.microsoft.com/office/drawing/2010/main" xmlns="">
                 <a:solidFill>
                   <a:srgbClr val="FFFFFF"/>
                 </a:solidFill>
               </a14:hiddenFill>
             </a:ext>
             <a:ext uri="{91240B29-F687-4f45-9708-019B960494DF}">
-              <a14:hiddenLine xmlns="" xmlns:a14="http://schemas.microsoft.com/office/drawing/2010/main" w="9525">
+              <a14:hiddenLine xmlns:a14="http://schemas.microsoft.com/office/drawing/2010/main" xmlns="" w="9525">
                 <a:solidFill>
                   <a:srgbClr val="000000"/>
                 </a:solidFill>
@@ -13151,7 +13224,7 @@
               </a14:hiddenLine>
             </a:ext>
             <a:ext uri="{FAA26D3D-D897-4be2-8F04-BA451C77F1D7}">
-              <ma14:placeholderFlag xmlns="" xmlns:ma14="http://schemas.microsoft.com/office/mac/drawingml/2011/main" val="1"/>
+              <ma14:placeholderFlag xmlns:ma14="http://schemas.microsoft.com/office/mac/drawingml/2011/main" xmlns="" val="1"/>
             </a:ext>
           </a:extLst>
         </p:spPr>

</xml_diff>